<commit_message>
without new training data
</commit_message>
<xml_diff>
--- a/stanford ner.pptx
+++ b/stanford ner.pptx
@@ -234,7 +234,7 @@
           <a:p>
             <a:fld id="{B55E147C-AA65-447C-BCCD-710E39FCD46C}" type="datetimeFigureOut">
               <a:rPr lang="zh-TW" altLang="en-US" smtClean="0"/>
-              <a:t>2015/9/29</a:t>
+              <a:t>2015/10/17</a:t>
             </a:fld>
             <a:endParaRPr lang="zh-TW" altLang="en-US"/>
           </a:p>
@@ -774,7 +774,7 @@
           <a:p>
             <a:fld id="{F01B79FB-98E9-4AD9-8781-61BCFFDB0F2B}" type="datetime1">
               <a:rPr lang="zh-TW" altLang="en-US" smtClean="0"/>
-              <a:t>2015/9/29</a:t>
+              <a:t>2015/10/17</a:t>
             </a:fld>
             <a:endParaRPr lang="zh-TW" altLang="en-US"/>
           </a:p>
@@ -1112,7 +1112,7 @@
           <a:p>
             <a:fld id="{48F6D734-9D98-4A98-9E19-7EFE4887E21E}" type="datetime1">
               <a:rPr lang="zh-TW" altLang="en-US" smtClean="0"/>
-              <a:t>2015/9/29</a:t>
+              <a:t>2015/10/17</a:t>
             </a:fld>
             <a:endParaRPr lang="zh-TW" altLang="en-US"/>
           </a:p>
@@ -1514,7 +1514,7 @@
           <a:p>
             <a:fld id="{48F6D734-9D98-4A98-9E19-7EFE4887E21E}" type="datetime1">
               <a:rPr lang="zh-TW" altLang="en-US" smtClean="0"/>
-              <a:t>2015/9/29</a:t>
+              <a:t>2015/10/17</a:t>
             </a:fld>
             <a:endParaRPr lang="zh-TW" altLang="en-US"/>
           </a:p>
@@ -1851,7 +1851,7 @@
           <a:p>
             <a:fld id="{48F6D734-9D98-4A98-9E19-7EFE4887E21E}" type="datetime1">
               <a:rPr lang="zh-TW" altLang="en-US" smtClean="0"/>
-              <a:t>2015/9/29</a:t>
+              <a:t>2015/10/17</a:t>
             </a:fld>
             <a:endParaRPr lang="zh-TW" altLang="en-US"/>
           </a:p>
@@ -2172,7 +2172,7 @@
           <a:p>
             <a:fld id="{48F6D734-9D98-4A98-9E19-7EFE4887E21E}" type="datetime1">
               <a:rPr lang="zh-TW" altLang="en-US" smtClean="0"/>
-              <a:t>2015/9/29</a:t>
+              <a:t>2015/10/17</a:t>
             </a:fld>
             <a:endParaRPr lang="zh-TW" altLang="en-US"/>
           </a:p>
@@ -2569,7 +2569,7 @@
           <a:p>
             <a:fld id="{48F6D734-9D98-4A98-9E19-7EFE4887E21E}" type="datetime1">
               <a:rPr lang="zh-TW" altLang="en-US" smtClean="0"/>
-              <a:t>2015/9/29</a:t>
+              <a:t>2015/10/17</a:t>
             </a:fld>
             <a:endParaRPr lang="zh-TW" altLang="en-US"/>
           </a:p>
@@ -2827,7 +2827,7 @@
           <a:p>
             <a:fld id="{A392B7C8-D3B0-4F18-A8D4-75C71B18EA40}" type="datetime1">
               <a:rPr lang="zh-TW" altLang="en-US" smtClean="0"/>
-              <a:t>2015/9/29</a:t>
+              <a:t>2015/10/17</a:t>
             </a:fld>
             <a:endParaRPr lang="zh-TW" altLang="en-US"/>
           </a:p>
@@ -3089,7 +3089,7 @@
           <a:p>
             <a:fld id="{31781033-5BA3-4324-B74D-6A919A75A912}" type="datetime1">
               <a:rPr lang="zh-TW" altLang="en-US" smtClean="0"/>
-              <a:t>2015/9/29</a:t>
+              <a:t>2015/10/17</a:t>
             </a:fld>
             <a:endParaRPr lang="zh-TW" altLang="en-US"/>
           </a:p>
@@ -3351,7 +3351,7 @@
           <a:p>
             <a:fld id="{2F587E1E-63B5-4774-A6C1-143684EEA6E9}" type="datetime1">
               <a:rPr lang="zh-TW" altLang="en-US" smtClean="0"/>
-              <a:t>2015/9/29</a:t>
+              <a:t>2015/10/17</a:t>
             </a:fld>
             <a:endParaRPr lang="zh-TW" altLang="en-US"/>
           </a:p>
@@ -3680,7 +3680,7 @@
           <a:p>
             <a:fld id="{08ABFA8D-7D66-4BBB-9CCA-A43ADC3CE071}" type="datetime1">
               <a:rPr lang="zh-TW" altLang="en-US" smtClean="0"/>
-              <a:t>2015/9/29</a:t>
+              <a:t>2015/10/17</a:t>
             </a:fld>
             <a:endParaRPr lang="zh-TW" altLang="en-US"/>
           </a:p>
@@ -4003,7 +4003,7 @@
           <a:p>
             <a:fld id="{D9589BFA-65BF-47B9-A6B1-AC47F0EAA4EC}" type="datetime1">
               <a:rPr lang="zh-TW" altLang="en-US" smtClean="0"/>
-              <a:t>2015/9/29</a:t>
+              <a:t>2015/10/17</a:t>
             </a:fld>
             <a:endParaRPr lang="zh-TW" altLang="en-US"/>
           </a:p>
@@ -4460,7 +4460,7 @@
           <a:p>
             <a:fld id="{63B0F399-DE5D-49AD-BE92-77F3B0F9BA5C}" type="datetime1">
               <a:rPr lang="zh-TW" altLang="en-US" smtClean="0"/>
-              <a:t>2015/9/29</a:t>
+              <a:t>2015/10/17</a:t>
             </a:fld>
             <a:endParaRPr lang="zh-TW" altLang="en-US"/>
           </a:p>
@@ -4665,7 +4665,7 @@
           <a:p>
             <a:fld id="{5849889D-0216-4203-98A5-C5F48ADB5624}" type="datetime1">
               <a:rPr lang="zh-TW" altLang="en-US" smtClean="0"/>
-              <a:t>2015/9/29</a:t>
+              <a:t>2015/10/17</a:t>
             </a:fld>
             <a:endParaRPr lang="zh-TW" altLang="en-US"/>
           </a:p>
@@ -4842,7 +4842,7 @@
           <a:p>
             <a:fld id="{9F424B6A-8A84-4C73-BDF9-7B93CE48E34B}" type="datetime1">
               <a:rPr lang="zh-TW" altLang="en-US" smtClean="0"/>
-              <a:t>2015/9/29</a:t>
+              <a:t>2015/10/17</a:t>
             </a:fld>
             <a:endParaRPr lang="zh-TW" altLang="en-US"/>
           </a:p>
@@ -5175,7 +5175,7 @@
           <a:p>
             <a:fld id="{E84AF2F8-E4D9-4F01-8794-FDA7E11747D1}" type="datetime1">
               <a:rPr lang="zh-TW" altLang="en-US" smtClean="0"/>
-              <a:t>2015/9/29</a:t>
+              <a:t>2015/10/17</a:t>
             </a:fld>
             <a:endParaRPr lang="zh-TW" altLang="en-US"/>
           </a:p>
@@ -5520,7 +5520,7 @@
           <a:p>
             <a:fld id="{D74AB1E1-999B-45CB-88E7-E767B1437E4B}" type="datetime1">
               <a:rPr lang="zh-TW" altLang="en-US" smtClean="0"/>
-              <a:t>2015/9/29</a:t>
+              <a:t>2015/10/17</a:t>
             </a:fld>
             <a:endParaRPr lang="zh-TW" altLang="en-US"/>
           </a:p>
@@ -7637,7 +7637,7 @@
           <a:p>
             <a:fld id="{48F6D734-9D98-4A98-9E19-7EFE4887E21E}" type="datetime1">
               <a:rPr lang="zh-TW" altLang="en-US" smtClean="0"/>
-              <a:t>2015/9/29</a:t>
+              <a:t>2015/10/17</a:t>
             </a:fld>
             <a:endParaRPr lang="zh-TW" altLang="en-US"/>
           </a:p>
@@ -9264,7 +9264,7 @@
         </p:blipFill>
         <p:spPr>
           <a:xfrm>
-            <a:off x="2589211" y="2549892"/>
+            <a:off x="3517259" y="2549892"/>
             <a:ext cx="5817811" cy="1690406"/>
           </a:xfrm>
           <a:prstGeom prst="rect">
@@ -9294,7 +9294,7 @@
         </p:blipFill>
         <p:spPr>
           <a:xfrm>
-            <a:off x="2589212" y="4240298"/>
+            <a:off x="3517259" y="4240298"/>
             <a:ext cx="5817810" cy="2420549"/>
           </a:xfrm>
           <a:prstGeom prst="rect">
@@ -9540,11 +9540,7 @@
           <a:p>
             <a:r>
               <a:rPr lang="en-US" altLang="zh-TW" smtClean="0"/>
-              <a:t>Online </a:t>
-            </a:r>
-            <a:r>
-              <a:rPr lang="en-US" altLang="zh-TW" smtClean="0"/>
-              <a:t>Demo</a:t>
+              <a:t>Online Demo</a:t>
             </a:r>
             <a:endParaRPr lang="en-US" altLang="zh-TW" dirty="0" smtClean="0"/>
           </a:p>
@@ -10767,11 +10763,7 @@
             </a:r>
             <a:r>
               <a:rPr lang="en-US" altLang="zh-TW" dirty="0" smtClean="0"/>
-              <a:t>model</a:t>
-            </a:r>
-            <a:r>
-              <a:rPr lang="en-US" altLang="zh-TW" dirty="0" smtClean="0"/>
-              <a:t>(.gz</a:t>
+              <a:t>model(.gz</a:t>
             </a:r>
             <a:r>
               <a:rPr lang="zh-TW" altLang="en-US" dirty="0" smtClean="0"/>
@@ -11201,7 +11193,7 @@
       </p:sp>
       <p:pic>
         <p:nvPicPr>
-          <p:cNvPr id="5" name="內容版面配置區 4"/>
+          <p:cNvPr id="6" name="圖片 5"/>
           <p:cNvPicPr>
             <a:picLocks noChangeAspect="1"/>
           </p:cNvPicPr>
@@ -11221,8 +11213,38 @@
         </p:blipFill>
         <p:spPr>
           <a:xfrm>
-            <a:off x="4939889" y="1264555"/>
-            <a:ext cx="6564723" cy="5591057"/>
+            <a:off x="6979606" y="2571471"/>
+            <a:ext cx="4525006" cy="4001058"/>
+          </a:xfrm>
+          <a:prstGeom prst="rect">
+            <a:avLst/>
+          </a:prstGeom>
+        </p:spPr>
+      </p:pic>
+      <p:pic>
+        <p:nvPicPr>
+          <p:cNvPr id="7" name="圖片 6"/>
+          <p:cNvPicPr>
+            <a:picLocks noChangeAspect="1"/>
+          </p:cNvPicPr>
+          <p:nvPr/>
+        </p:nvPicPr>
+        <p:blipFill>
+          <a:blip r:embed="rId3">
+            <a:extLst>
+              <a:ext uri="{28A0092B-C50C-407E-A947-70E740481C1C}">
+                <a14:useLocalDpi xmlns:a14="http://schemas.microsoft.com/office/drawing/2010/main" val="0"/>
+              </a:ext>
+            </a:extLst>
+          </a:blip>
+          <a:stretch>
+            <a:fillRect/>
+          </a:stretch>
+        </p:blipFill>
+        <p:spPr>
+          <a:xfrm>
+            <a:off x="2264727" y="2571471"/>
+            <a:ext cx="4553585" cy="4029637"/>
           </a:xfrm>
           <a:prstGeom prst="rect">
             <a:avLst/>

</xml_diff>